<commit_message>
Update: Update VA Coursework
</commit_message>
<xml_diff>
--- a/Visual_Analytics/Visual_Analytics_Powerpoint.pptx
+++ b/Visual_Analytics/Visual_Analytics_Powerpoint.pptx
@@ -194,7 +194,7 @@
           <a:bodyPr lIns="0" rIns="0" tIns="0" bIns="0" anchor="b"/>
           <a:p>
             <a:pPr algn="r"/>
-            <a:fld id="{647792E7-4464-43B5-915B-7872357AC370}" type="slidenum">
+            <a:fld id="{C6AE6D60-819A-42B2-878F-20F796B084BA}" type="slidenum">
               <a:rPr lang="en-GB" sz="1400">
                 <a:latin typeface="Times New Roman"/>
               </a:rPr>
@@ -229,7 +229,7 @@
       </p:grpSpPr>
       <p:sp>
         <p:nvSpPr>
-          <p:cNvPr id="193" name="PlaceHolder 1"/>
+          <p:cNvPr id="194" name="PlaceHolder 1"/>
           <p:cNvSpPr>
             <a:spLocks noGrp="1"/>
           </p:cNvSpPr>
@@ -240,7 +240,7 @@
         <p:spPr>
           <a:xfrm>
             <a:off x="685800" y="4343400"/>
-            <a:ext cx="5483880" cy="4112280"/>
+            <a:ext cx="5483160" cy="4111560"/>
           </a:xfrm>
           <a:prstGeom prst="rect">
             <a:avLst/>
@@ -255,14 +255,14 @@
       </p:sp>
       <p:sp>
         <p:nvSpPr>
-          <p:cNvPr id="194" name="CustomShape 2"/>
+          <p:cNvPr id="195" name="CustomShape 2"/>
           <p:cNvSpPr/>
           <p:nvPr/>
         </p:nvSpPr>
         <p:spPr>
           <a:xfrm>
             <a:off x="3884760" y="8685360"/>
-            <a:ext cx="2969280" cy="454680"/>
+            <a:ext cx="2968560" cy="453960"/>
           </a:xfrm>
           <a:prstGeom prst="rect">
             <a:avLst/>
@@ -286,7 +286,7 @@
                 <a:spcPct val="100000"/>
               </a:lnSpc>
             </a:pPr>
-            <a:fld id="{9A0BFA99-6EF4-44D5-B5F5-1B2689F42330}" type="slidenum">
+            <a:fld id="{2E7029A2-2883-4FE5-A35D-CD15A1F51511}" type="slidenum">
               <a:rPr lang="en-GB" sz="1200" strike="noStrike">
                 <a:solidFill>
                   <a:srgbClr val="000000"/>
@@ -324,7 +324,7 @@
       </p:grpSpPr>
       <p:sp>
         <p:nvSpPr>
-          <p:cNvPr id="177" name="PlaceHolder 1"/>
+          <p:cNvPr id="178" name="PlaceHolder 1"/>
           <p:cNvSpPr>
             <a:spLocks noGrp="1"/>
           </p:cNvSpPr>
@@ -335,7 +335,7 @@
         <p:spPr>
           <a:xfrm>
             <a:off x="685800" y="4343400"/>
-            <a:ext cx="5483880" cy="4112280"/>
+            <a:ext cx="5483160" cy="4111560"/>
           </a:xfrm>
           <a:prstGeom prst="rect">
             <a:avLst/>
@@ -350,14 +350,14 @@
       </p:sp>
       <p:sp>
         <p:nvSpPr>
-          <p:cNvPr id="178" name="CustomShape 2"/>
+          <p:cNvPr id="179" name="CustomShape 2"/>
           <p:cNvSpPr/>
           <p:nvPr/>
         </p:nvSpPr>
         <p:spPr>
           <a:xfrm>
             <a:off x="3884760" y="8685360"/>
-            <a:ext cx="2969280" cy="454680"/>
+            <a:ext cx="2968560" cy="453960"/>
           </a:xfrm>
           <a:prstGeom prst="rect">
             <a:avLst/>
@@ -381,7 +381,7 @@
                 <a:spcPct val="100000"/>
               </a:lnSpc>
             </a:pPr>
-            <a:fld id="{C14E6D06-54DF-44D4-B839-78D55782A880}" type="slidenum">
+            <a:fld id="{B818B6F5-034C-4973-98E1-BE1B6BFDD38D}" type="slidenum">
               <a:rPr lang="en-GB" sz="1200" strike="noStrike">
                 <a:solidFill>
                   <a:srgbClr val="000000"/>
@@ -419,7 +419,7 @@
       </p:grpSpPr>
       <p:sp>
         <p:nvSpPr>
-          <p:cNvPr id="179" name="PlaceHolder 1"/>
+          <p:cNvPr id="180" name="PlaceHolder 1"/>
           <p:cNvSpPr>
             <a:spLocks noGrp="1"/>
           </p:cNvSpPr>
@@ -430,7 +430,7 @@
         <p:spPr>
           <a:xfrm>
             <a:off x="685800" y="4343400"/>
-            <a:ext cx="5483880" cy="4112280"/>
+            <a:ext cx="5483160" cy="4111560"/>
           </a:xfrm>
           <a:prstGeom prst="rect">
             <a:avLst/>
@@ -445,14 +445,14 @@
       </p:sp>
       <p:sp>
         <p:nvSpPr>
-          <p:cNvPr id="180" name="CustomShape 2"/>
+          <p:cNvPr id="181" name="CustomShape 2"/>
           <p:cNvSpPr/>
           <p:nvPr/>
         </p:nvSpPr>
         <p:spPr>
           <a:xfrm>
             <a:off x="3884760" y="8685360"/>
-            <a:ext cx="2969280" cy="454680"/>
+            <a:ext cx="2968560" cy="453960"/>
           </a:xfrm>
           <a:prstGeom prst="rect">
             <a:avLst/>
@@ -476,7 +476,7 @@
                 <a:spcPct val="100000"/>
               </a:lnSpc>
             </a:pPr>
-            <a:fld id="{82B681C1-D8A1-411F-B304-7FAFB06FF202}" type="slidenum">
+            <a:fld id="{0214EC45-FF00-467C-AAA1-CE6681307155}" type="slidenum">
               <a:rPr lang="en-GB" sz="1200" strike="noStrike">
                 <a:solidFill>
                   <a:srgbClr val="000000"/>
@@ -514,7 +514,7 @@
       </p:grpSpPr>
       <p:sp>
         <p:nvSpPr>
-          <p:cNvPr id="181" name="PlaceHolder 1"/>
+          <p:cNvPr id="182" name="PlaceHolder 1"/>
           <p:cNvSpPr>
             <a:spLocks noGrp="1"/>
           </p:cNvSpPr>
@@ -525,7 +525,7 @@
         <p:spPr>
           <a:xfrm>
             <a:off x="685800" y="4343400"/>
-            <a:ext cx="5483880" cy="4112280"/>
+            <a:ext cx="5483160" cy="4111560"/>
           </a:xfrm>
           <a:prstGeom prst="rect">
             <a:avLst/>
@@ -540,14 +540,14 @@
       </p:sp>
       <p:sp>
         <p:nvSpPr>
-          <p:cNvPr id="182" name="CustomShape 2"/>
+          <p:cNvPr id="183" name="CustomShape 2"/>
           <p:cNvSpPr/>
           <p:nvPr/>
         </p:nvSpPr>
         <p:spPr>
           <a:xfrm>
             <a:off x="3884760" y="8685360"/>
-            <a:ext cx="2969280" cy="454680"/>
+            <a:ext cx="2968560" cy="453960"/>
           </a:xfrm>
           <a:prstGeom prst="rect">
             <a:avLst/>
@@ -571,7 +571,7 @@
                 <a:spcPct val="100000"/>
               </a:lnSpc>
             </a:pPr>
-            <a:fld id="{07BCE4ED-1D00-411F-B7A6-F3D1B303432C}" type="slidenum">
+            <a:fld id="{BA5A52E9-1FE0-4A11-8636-C27C207CE254}" type="slidenum">
               <a:rPr lang="en-GB" sz="1200" strike="noStrike">
                 <a:solidFill>
                   <a:srgbClr val="000000"/>
@@ -609,7 +609,7 @@
       </p:grpSpPr>
       <p:sp>
         <p:nvSpPr>
-          <p:cNvPr id="183" name="PlaceHolder 1"/>
+          <p:cNvPr id="184" name="PlaceHolder 1"/>
           <p:cNvSpPr>
             <a:spLocks noGrp="1"/>
           </p:cNvSpPr>
@@ -620,7 +620,7 @@
         <p:spPr>
           <a:xfrm>
             <a:off x="685800" y="4343400"/>
-            <a:ext cx="5483880" cy="4112280"/>
+            <a:ext cx="5483160" cy="4111560"/>
           </a:xfrm>
           <a:prstGeom prst="rect">
             <a:avLst/>
@@ -635,14 +635,14 @@
       </p:sp>
       <p:sp>
         <p:nvSpPr>
-          <p:cNvPr id="184" name="CustomShape 2"/>
+          <p:cNvPr id="185" name="CustomShape 2"/>
           <p:cNvSpPr/>
           <p:nvPr/>
         </p:nvSpPr>
         <p:spPr>
           <a:xfrm>
             <a:off x="3884760" y="8685360"/>
-            <a:ext cx="2969280" cy="454680"/>
+            <a:ext cx="2968560" cy="453960"/>
           </a:xfrm>
           <a:prstGeom prst="rect">
             <a:avLst/>
@@ -666,7 +666,7 @@
                 <a:spcPct val="100000"/>
               </a:lnSpc>
             </a:pPr>
-            <a:fld id="{054E564E-3252-452E-95B9-214D70FE9DAD}" type="slidenum">
+            <a:fld id="{D75ECC2A-B0CA-4D02-8AF8-DC5BE791368E}" type="slidenum">
               <a:rPr lang="en-GB" sz="1200" strike="noStrike">
                 <a:solidFill>
                   <a:srgbClr val="000000"/>
@@ -704,7 +704,7 @@
       </p:grpSpPr>
       <p:sp>
         <p:nvSpPr>
-          <p:cNvPr id="185" name="PlaceHolder 1"/>
+          <p:cNvPr id="186" name="PlaceHolder 1"/>
           <p:cNvSpPr>
             <a:spLocks noGrp="1"/>
           </p:cNvSpPr>
@@ -715,7 +715,7 @@
         <p:spPr>
           <a:xfrm>
             <a:off x="685800" y="4343400"/>
-            <a:ext cx="5483880" cy="4112280"/>
+            <a:ext cx="5483160" cy="4111560"/>
           </a:xfrm>
           <a:prstGeom prst="rect">
             <a:avLst/>
@@ -730,14 +730,14 @@
       </p:sp>
       <p:sp>
         <p:nvSpPr>
-          <p:cNvPr id="186" name="CustomShape 2"/>
+          <p:cNvPr id="187" name="CustomShape 2"/>
           <p:cNvSpPr/>
           <p:nvPr/>
         </p:nvSpPr>
         <p:spPr>
           <a:xfrm>
             <a:off x="3884760" y="8685360"/>
-            <a:ext cx="2969280" cy="454680"/>
+            <a:ext cx="2968560" cy="453960"/>
           </a:xfrm>
           <a:prstGeom prst="rect">
             <a:avLst/>
@@ -761,7 +761,7 @@
                 <a:spcPct val="100000"/>
               </a:lnSpc>
             </a:pPr>
-            <a:fld id="{EB6B40E4-C85A-4690-8F91-69089EDBEB7F}" type="slidenum">
+            <a:fld id="{E3AC7C76-5C1A-4376-881D-1DE311336531}" type="slidenum">
               <a:rPr lang="en-GB" sz="1200" strike="noStrike">
                 <a:solidFill>
                   <a:srgbClr val="000000"/>
@@ -799,7 +799,7 @@
       </p:grpSpPr>
       <p:sp>
         <p:nvSpPr>
-          <p:cNvPr id="187" name="PlaceHolder 1"/>
+          <p:cNvPr id="188" name="PlaceHolder 1"/>
           <p:cNvSpPr>
             <a:spLocks noGrp="1"/>
           </p:cNvSpPr>
@@ -810,7 +810,7 @@
         <p:spPr>
           <a:xfrm>
             <a:off x="685800" y="4343400"/>
-            <a:ext cx="5483880" cy="4112280"/>
+            <a:ext cx="5483160" cy="4111560"/>
           </a:xfrm>
           <a:prstGeom prst="rect">
             <a:avLst/>
@@ -825,14 +825,14 @@
       </p:sp>
       <p:sp>
         <p:nvSpPr>
-          <p:cNvPr id="188" name="CustomShape 2"/>
+          <p:cNvPr id="189" name="CustomShape 2"/>
           <p:cNvSpPr/>
           <p:nvPr/>
         </p:nvSpPr>
         <p:spPr>
           <a:xfrm>
             <a:off x="3884760" y="8685360"/>
-            <a:ext cx="2969280" cy="454680"/>
+            <a:ext cx="2968560" cy="453960"/>
           </a:xfrm>
           <a:prstGeom prst="rect">
             <a:avLst/>
@@ -856,7 +856,7 @@
                 <a:spcPct val="100000"/>
               </a:lnSpc>
             </a:pPr>
-            <a:fld id="{8187E053-1A42-4447-B44F-76DB27E1B405}" type="slidenum">
+            <a:fld id="{82A908D5-3C8E-464C-8EF8-156F731D812A}" type="slidenum">
               <a:rPr lang="en-GB" sz="1200" strike="noStrike">
                 <a:solidFill>
                   <a:srgbClr val="000000"/>
@@ -894,7 +894,7 @@
       </p:grpSpPr>
       <p:sp>
         <p:nvSpPr>
-          <p:cNvPr id="189" name="PlaceHolder 1"/>
+          <p:cNvPr id="190" name="PlaceHolder 1"/>
           <p:cNvSpPr>
             <a:spLocks noGrp="1"/>
           </p:cNvSpPr>
@@ -905,7 +905,7 @@
         <p:spPr>
           <a:xfrm>
             <a:off x="685800" y="4343400"/>
-            <a:ext cx="5483880" cy="4112280"/>
+            <a:ext cx="5483160" cy="4111560"/>
           </a:xfrm>
           <a:prstGeom prst="rect">
             <a:avLst/>
@@ -920,14 +920,14 @@
       </p:sp>
       <p:sp>
         <p:nvSpPr>
-          <p:cNvPr id="190" name="CustomShape 2"/>
+          <p:cNvPr id="191" name="CustomShape 2"/>
           <p:cNvSpPr/>
           <p:nvPr/>
         </p:nvSpPr>
         <p:spPr>
           <a:xfrm>
             <a:off x="3884760" y="8685360"/>
-            <a:ext cx="2969280" cy="454680"/>
+            <a:ext cx="2968560" cy="453960"/>
           </a:xfrm>
           <a:prstGeom prst="rect">
             <a:avLst/>
@@ -951,7 +951,7 @@
                 <a:spcPct val="100000"/>
               </a:lnSpc>
             </a:pPr>
-            <a:fld id="{732D9A75-EE19-4AE4-B62B-69B99B36B6B5}" type="slidenum">
+            <a:fld id="{51B0CEE1-C405-46A8-8211-07D36F10F241}" type="slidenum">
               <a:rPr lang="en-GB" sz="1200" strike="noStrike">
                 <a:solidFill>
                   <a:srgbClr val="000000"/>
@@ -989,7 +989,7 @@
       </p:grpSpPr>
       <p:sp>
         <p:nvSpPr>
-          <p:cNvPr id="191" name="PlaceHolder 1"/>
+          <p:cNvPr id="192" name="PlaceHolder 1"/>
           <p:cNvSpPr>
             <a:spLocks noGrp="1"/>
           </p:cNvSpPr>
@@ -1000,7 +1000,7 @@
         <p:spPr>
           <a:xfrm>
             <a:off x="685800" y="4343400"/>
-            <a:ext cx="5483880" cy="4112280"/>
+            <a:ext cx="5483160" cy="4111560"/>
           </a:xfrm>
           <a:prstGeom prst="rect">
             <a:avLst/>
@@ -1015,14 +1015,14 @@
       </p:sp>
       <p:sp>
         <p:nvSpPr>
-          <p:cNvPr id="192" name="CustomShape 2"/>
+          <p:cNvPr id="193" name="CustomShape 2"/>
           <p:cNvSpPr/>
           <p:nvPr/>
         </p:nvSpPr>
         <p:spPr>
           <a:xfrm>
             <a:off x="3884760" y="8685360"/>
-            <a:ext cx="2969280" cy="454680"/>
+            <a:ext cx="2968560" cy="453960"/>
           </a:xfrm>
           <a:prstGeom prst="rect">
             <a:avLst/>
@@ -1046,7 +1046,7 @@
                 <a:spcPct val="100000"/>
               </a:lnSpc>
             </a:pPr>
-            <a:fld id="{ABB91348-B0B4-474D-ADB8-25CA7DA97D5D}" type="slidenum">
+            <a:fld id="{5A660D47-E69A-4F6D-A6CD-DF12CCC5EDDF}" type="slidenum">
               <a:rPr lang="en-GB" sz="1200" strike="noStrike">
                 <a:solidFill>
                   <a:srgbClr val="000000"/>
@@ -3410,7 +3410,7 @@
         <p:spPr>
           <a:xfrm>
             <a:off x="8232480" y="360000"/>
-            <a:ext cx="551880" cy="473760"/>
+            <a:ext cx="551160" cy="473040"/>
           </a:xfrm>
           <a:prstGeom prst="rect">
             <a:avLst/>
@@ -3675,7 +3675,7 @@
         <p:spPr>
           <a:xfrm>
             <a:off x="8232480" y="360000"/>
-            <a:ext cx="551880" cy="473760"/>
+            <a:ext cx="551160" cy="473040"/>
           </a:xfrm>
           <a:prstGeom prst="rect">
             <a:avLst/>
@@ -3929,7 +3929,7 @@
         <p:spPr>
           <a:xfrm>
             <a:off x="457200" y="144000"/>
-            <a:ext cx="8227440" cy="1143000"/>
+            <a:ext cx="8226720" cy="1142280"/>
           </a:xfrm>
           <a:prstGeom prst="rect">
             <a:avLst/>
@@ -3976,7 +3976,7 @@
         <p:spPr>
           <a:xfrm>
             <a:off x="457200" y="1604520"/>
-            <a:ext cx="8227440" cy="3975480"/>
+            <a:ext cx="8226720" cy="3974760"/>
           </a:xfrm>
           <a:prstGeom prst="rect">
             <a:avLst/>
@@ -4071,7 +4071,7 @@
         <p:spPr>
           <a:xfrm>
             <a:off x="216000" y="6372000"/>
-            <a:ext cx="1510200" cy="446040"/>
+            <a:ext cx="1509480" cy="445320"/>
           </a:xfrm>
           <a:prstGeom prst="rect">
             <a:avLst/>
@@ -4094,7 +4094,7 @@
         <p:spPr>
           <a:xfrm>
             <a:off x="7944120" y="137880"/>
-            <a:ext cx="1126080" cy="868320"/>
+            <a:ext cx="1125360" cy="867600"/>
           </a:xfrm>
           <a:prstGeom prst="rect">
             <a:avLst/>
@@ -4162,7 +4162,7 @@
         <p:spPr>
           <a:xfrm>
             <a:off x="365040" y="294840"/>
-            <a:ext cx="7574760" cy="335880"/>
+            <a:ext cx="7574040" cy="335160"/>
           </a:xfrm>
           <a:prstGeom prst="rect">
             <a:avLst/>
@@ -4209,7 +4209,7 @@
         <p:spPr>
           <a:xfrm>
             <a:off x="365040" y="1419480"/>
-            <a:ext cx="8420760" cy="4432680"/>
+            <a:ext cx="8420040" cy="4431960"/>
           </a:xfrm>
           <a:prstGeom prst="rect">
             <a:avLst/>
@@ -4235,7 +4235,7 @@
         <p:spPr>
           <a:xfrm>
             <a:off x="149040" y="692640"/>
-            <a:ext cx="7595280" cy="232560"/>
+            <a:ext cx="7594560" cy="231840"/>
           </a:xfrm>
           <a:prstGeom prst="rect">
             <a:avLst/>
@@ -4285,7 +4285,7 @@
         <p:spPr>
           <a:xfrm>
             <a:off x="7967520" y="6437160"/>
-            <a:ext cx="827640" cy="362520"/>
+            <a:ext cx="826920" cy="361800"/>
           </a:xfrm>
           <a:prstGeom prst="rect">
             <a:avLst/>
@@ -4309,7 +4309,7 @@
                 <a:spcPct val="100000"/>
               </a:lnSpc>
             </a:pPr>
-            <a:fld id="{D4C8D67C-2234-4A5E-8487-639E565C7289}" type="slidenum">
+            <a:fld id="{F925A43B-3B07-4FD8-9B31-7D08148ED6B3}" type="slidenum">
               <a:rPr lang="en-GB" sz="800" strike="noStrike">
                 <a:solidFill>
                   <a:srgbClr val="9a8b7d"/>
@@ -4332,7 +4332,7 @@
         <p:spPr>
           <a:xfrm>
             <a:off x="369720" y="6058080"/>
-            <a:ext cx="8443440" cy="120600"/>
+            <a:ext cx="8442720" cy="119880"/>
           </a:xfrm>
           <a:prstGeom prst="rect">
             <a:avLst/>
@@ -4362,7 +4362,7 @@
         <p:spPr>
           <a:xfrm>
             <a:off x="216000" y="6372000"/>
-            <a:ext cx="1510200" cy="446040"/>
+            <a:ext cx="1509480" cy="445320"/>
           </a:xfrm>
           <a:prstGeom prst="rect">
             <a:avLst/>
@@ -4385,7 +4385,7 @@
         <p:spPr>
           <a:xfrm>
             <a:off x="7944480" y="138240"/>
-            <a:ext cx="1126080" cy="868320"/>
+            <a:ext cx="1125360" cy="867600"/>
           </a:xfrm>
           <a:prstGeom prst="rect">
             <a:avLst/>
@@ -4404,7 +4404,7 @@
         <p:spPr>
           <a:xfrm>
             <a:off x="288000" y="6084000"/>
-            <a:ext cx="8495280" cy="204120"/>
+            <a:ext cx="8494560" cy="203400"/>
           </a:xfrm>
           <a:prstGeom prst="rect">
             <a:avLst/>
@@ -4451,7 +4451,7 @@
         <p:spPr>
           <a:xfrm>
             <a:off x="432000" y="1368000"/>
-            <a:ext cx="5111280" cy="3959280"/>
+            <a:ext cx="5110560" cy="3958560"/>
           </a:xfrm>
           <a:prstGeom prst="rect">
             <a:avLst/>
@@ -4549,7 +4549,7 @@
                 <a:latin typeface="Arial"/>
                 <a:ea typeface="DejaVu Sans"/>
               </a:rPr>
-              <a:t>75%</a:t>
+              <a:t>70%</a:t>
             </a:r>
             <a:endParaRPr/>
           </a:p>
@@ -4566,13 +4566,36 @@
         </p:nvPicPr>
         <p:blipFill>
           <a:blip r:embed="rId3"/>
-          <a:srcRect l="0" t="0" r="0" b="264676"/>
+          <a:srcRect l="0" t="0" r="0" b="175272"/>
           <a:stretch/>
         </p:blipFill>
         <p:spPr>
           <a:xfrm>
             <a:off x="5184000" y="1728000"/>
-            <a:ext cx="3888000" cy="3618360"/>
+            <a:ext cx="3887280" cy="3617640"/>
+          </a:xfrm>
+          <a:prstGeom prst="rect">
+            <a:avLst/>
+          </a:prstGeom>
+          <a:ln>
+            <a:noFill/>
+          </a:ln>
+        </p:spPr>
+      </p:pic>
+      <p:pic>
+        <p:nvPicPr>
+          <p:cNvPr id="177" name="" descr=""/>
+          <p:cNvPicPr/>
+          <p:nvPr/>
+        </p:nvPicPr>
+        <p:blipFill>
+          <a:blip r:embed="rId4"/>
+          <a:stretch/>
+        </p:blipFill>
+        <p:spPr>
+          <a:xfrm>
+            <a:off x="5184000" y="1784880"/>
+            <a:ext cx="3416040" cy="3723120"/>
           </a:xfrm>
           <a:prstGeom prst="rect">
             <a:avLst/>
@@ -4640,7 +4663,7 @@
         <p:spPr>
           <a:xfrm>
             <a:off x="365040" y="294840"/>
-            <a:ext cx="7574760" cy="335880"/>
+            <a:ext cx="7574040" cy="335160"/>
           </a:xfrm>
           <a:prstGeom prst="rect">
             <a:avLst/>
@@ -4687,7 +4710,7 @@
         <p:spPr>
           <a:xfrm>
             <a:off x="365040" y="1419480"/>
-            <a:ext cx="5177880" cy="4432680"/>
+            <a:ext cx="5177160" cy="4431960"/>
           </a:xfrm>
           <a:prstGeom prst="rect">
             <a:avLst/>
@@ -4730,7 +4753,7 @@
               </a:lnSpc>
               <a:buSzPct val="45000"/>
               <a:buFont typeface="StarSymbol"/>
-              <a:buChar char=""/>
+              <a:buChar char="l"/>
             </a:pPr>
             <a:r>
               <a:rPr lang="en-GB" sz="1400" strike="noStrike">
@@ -4751,7 +4774,7 @@
               </a:lnSpc>
               <a:buSzPct val="45000"/>
               <a:buFont typeface="StarSymbol"/>
-              <a:buChar char=""/>
+              <a:buChar char="l"/>
             </a:pPr>
             <a:r>
               <a:rPr lang="en-GB" sz="1400" strike="noStrike">
@@ -4772,7 +4795,7 @@
               </a:lnSpc>
               <a:buSzPct val="45000"/>
               <a:buFont typeface="StarSymbol"/>
-              <a:buChar char=""/>
+              <a:buChar char="l"/>
             </a:pPr>
             <a:r>
               <a:rPr lang="en-GB" sz="1400" strike="noStrike">
@@ -4811,7 +4834,7 @@
               </a:lnSpc>
               <a:buSzPct val="45000"/>
               <a:buFont typeface="StarSymbol"/>
-              <a:buChar char=""/>
+              <a:buChar char="l"/>
             </a:pPr>
             <a:r>
               <a:rPr lang="en-GB" sz="1400" strike="noStrike">
@@ -4832,7 +4855,7 @@
               </a:lnSpc>
               <a:buSzPct val="45000"/>
               <a:buFont typeface="StarSymbol"/>
-              <a:buChar char=""/>
+              <a:buChar char="l"/>
             </a:pPr>
             <a:r>
               <a:rPr lang="en-GB" sz="1400" strike="noStrike">
@@ -4871,7 +4894,7 @@
               </a:lnSpc>
               <a:buSzPct val="45000"/>
               <a:buFont typeface="StarSymbol"/>
-              <a:buChar char=""/>
+              <a:buChar char="l"/>
             </a:pPr>
             <a:r>
               <a:rPr lang="en-GB" sz="1400" strike="noStrike">
@@ -4892,7 +4915,7 @@
               </a:lnSpc>
               <a:buSzPct val="45000"/>
               <a:buFont typeface="StarSymbol"/>
-              <a:buChar char=""/>
+              <a:buChar char="l"/>
             </a:pPr>
             <a:r>
               <a:rPr lang="en-GB" sz="1400" strike="noStrike">
@@ -4931,7 +4954,7 @@
               </a:lnSpc>
               <a:buSzPct val="45000"/>
               <a:buFont typeface="StarSymbol"/>
-              <a:buChar char=""/>
+              <a:buChar char="l"/>
             </a:pPr>
             <a:r>
               <a:rPr lang="en-GB" sz="1400" strike="noStrike">
@@ -4952,7 +4975,7 @@
               </a:lnSpc>
               <a:buSzPct val="45000"/>
               <a:buFont typeface="StarSymbol"/>
-              <a:buChar char=""/>
+              <a:buChar char="l"/>
             </a:pPr>
             <a:r>
               <a:rPr lang="en-GB" sz="1400" strike="noStrike">
@@ -4973,7 +4996,7 @@
               </a:lnSpc>
               <a:buSzPct val="45000"/>
               <a:buFont typeface="StarSymbol"/>
-              <a:buChar char=""/>
+              <a:buChar char="l"/>
             </a:pPr>
             <a:r>
               <a:rPr lang="en-GB" sz="1400" strike="noStrike">
@@ -4994,7 +5017,7 @@
               </a:lnSpc>
               <a:buSzPct val="45000"/>
               <a:buFont typeface="StarSymbol"/>
-              <a:buChar char=""/>
+              <a:buChar char="l"/>
             </a:pPr>
             <a:r>
               <a:rPr lang="en-GB" sz="1400" strike="noStrike">
@@ -5035,7 +5058,7 @@
         <p:spPr>
           <a:xfrm>
             <a:off x="149040" y="692640"/>
-            <a:ext cx="7595280" cy="232560"/>
+            <a:ext cx="7594560" cy="231840"/>
           </a:xfrm>
           <a:prstGeom prst="rect">
             <a:avLst/>
@@ -5085,7 +5108,7 @@
         <p:spPr>
           <a:xfrm>
             <a:off x="287280" y="6437160"/>
-            <a:ext cx="2634120" cy="362520"/>
+            <a:ext cx="2633400" cy="361800"/>
           </a:xfrm>
           <a:prstGeom prst="rect">
             <a:avLst/>
@@ -5111,7 +5134,7 @@
         <p:spPr>
           <a:xfrm>
             <a:off x="7967520" y="6437160"/>
-            <a:ext cx="827640" cy="362520"/>
+            <a:ext cx="826920" cy="361800"/>
           </a:xfrm>
           <a:prstGeom prst="rect">
             <a:avLst/>
@@ -5135,7 +5158,7 @@
                 <a:spcPct val="100000"/>
               </a:lnSpc>
             </a:pPr>
-            <a:fld id="{74C44607-3572-4E97-BFE0-6316F813DBA4}" type="slidenum">
+            <a:fld id="{4DA220D8-67FD-4DBF-B2A9-896FB4525E8F}" type="slidenum">
               <a:rPr lang="en-GB" sz="800" strike="noStrike">
                 <a:solidFill>
                   <a:srgbClr val="9a8b7d"/>
@@ -5158,7 +5181,7 @@
         <p:spPr>
           <a:xfrm>
             <a:off x="369720" y="6058080"/>
-            <a:ext cx="8443440" cy="120600"/>
+            <a:ext cx="8442720" cy="119880"/>
           </a:xfrm>
           <a:prstGeom prst="rect">
             <a:avLst/>
@@ -5188,7 +5211,7 @@
         <p:spPr>
           <a:xfrm>
             <a:off x="216000" y="6372000"/>
-            <a:ext cx="1510200" cy="446040"/>
+            <a:ext cx="1509480" cy="445320"/>
           </a:xfrm>
           <a:prstGeom prst="rect">
             <a:avLst/>
@@ -5211,7 +5234,7 @@
         <p:spPr>
           <a:xfrm>
             <a:off x="7944480" y="138240"/>
-            <a:ext cx="1126080" cy="868320"/>
+            <a:ext cx="1125360" cy="867600"/>
           </a:xfrm>
           <a:prstGeom prst="rect">
             <a:avLst/>
@@ -5230,7 +5253,7 @@
         <p:spPr>
           <a:xfrm>
             <a:off x="360000" y="6059160"/>
-            <a:ext cx="7486920" cy="203760"/>
+            <a:ext cx="7486200" cy="203040"/>
           </a:xfrm>
           <a:prstGeom prst="rect">
             <a:avLst/>
@@ -5276,13 +5299,36 @@
         </p:nvPicPr>
         <p:blipFill>
           <a:blip r:embed="rId3"/>
-          <a:srcRect l="132127" t="132075" r="263829" b="132075"/>
+          <a:srcRect l="1132185" t="-143499" r="-2247013" b="-143499"/>
           <a:stretch/>
         </p:blipFill>
         <p:spPr>
           <a:xfrm>
-            <a:off x="5328000" y="2257920"/>
-            <a:ext cx="3408120" cy="2854080"/>
+            <a:off x="5472000" y="1800000"/>
+            <a:ext cx="6695640" cy="3501720"/>
+          </a:xfrm>
+          <a:prstGeom prst="rect">
+            <a:avLst/>
+          </a:prstGeom>
+          <a:ln>
+            <a:noFill/>
+          </a:ln>
+        </p:spPr>
+      </p:pic>
+      <p:pic>
+        <p:nvPicPr>
+          <p:cNvPr id="97" name="" descr=""/>
+          <p:cNvPicPr/>
+          <p:nvPr/>
+        </p:nvPicPr>
+        <p:blipFill>
+          <a:blip r:embed="rId4"/>
+          <a:stretch/>
+        </p:blipFill>
+        <p:spPr>
+          <a:xfrm>
+            <a:off x="5129280" y="2160000"/>
+            <a:ext cx="3870720" cy="3161160"/>
           </a:xfrm>
           <a:prstGeom prst="rect">
             <a:avLst/>
@@ -5343,14 +5389,14 @@
       </p:grpSpPr>
       <p:sp>
         <p:nvSpPr>
-          <p:cNvPr id="97" name="CustomShape 1"/>
+          <p:cNvPr id="98" name="CustomShape 1"/>
           <p:cNvSpPr/>
           <p:nvPr/>
         </p:nvSpPr>
         <p:spPr>
           <a:xfrm>
             <a:off x="365040" y="294840"/>
-            <a:ext cx="7574760" cy="335880"/>
+            <a:ext cx="7574040" cy="335160"/>
           </a:xfrm>
           <a:prstGeom prst="rect">
             <a:avLst/>
@@ -5390,14 +5436,14 @@
       </p:sp>
       <p:sp>
         <p:nvSpPr>
-          <p:cNvPr id="98" name="CustomShape 2"/>
+          <p:cNvPr id="99" name="CustomShape 2"/>
           <p:cNvSpPr/>
           <p:nvPr/>
         </p:nvSpPr>
         <p:spPr>
           <a:xfrm>
             <a:off x="365040" y="1419480"/>
-            <a:ext cx="5250240" cy="4432680"/>
+            <a:ext cx="5249520" cy="4431960"/>
           </a:xfrm>
           <a:prstGeom prst="rect">
             <a:avLst/>
@@ -5572,7 +5618,7 @@
               </a:lnSpc>
               <a:buSzPct val="45000"/>
               <a:buFont typeface="StarSymbol"/>
-              <a:buChar char=""/>
+              <a:buChar char="l"/>
             </a:pPr>
             <a:r>
               <a:rPr lang="en-GB" sz="1400" strike="noStrike">
@@ -5593,7 +5639,7 @@
               </a:lnSpc>
               <a:buSzPct val="45000"/>
               <a:buFont typeface="StarSymbol"/>
-              <a:buChar char=""/>
+              <a:buChar char="l"/>
             </a:pPr>
             <a:r>
               <a:rPr lang="en-GB" sz="1400" strike="noStrike">
@@ -5650,7 +5696,7 @@
               </a:lnSpc>
               <a:buSzPct val="45000"/>
               <a:buFont typeface="StarSymbol"/>
-              <a:buChar char=""/>
+              <a:buChar char="l"/>
             </a:pPr>
             <a:r>
               <a:rPr lang="en-GB" sz="1400" strike="noStrike">
@@ -5671,7 +5717,7 @@
               </a:lnSpc>
               <a:buSzPct val="45000"/>
               <a:buFont typeface="StarSymbol"/>
-              <a:buChar char=""/>
+              <a:buChar char="l"/>
             </a:pPr>
             <a:r>
               <a:rPr lang="en-GB" sz="1400" strike="noStrike">
@@ -5690,9 +5736,6 @@
               <a:lnSpc>
                 <a:spcPct val="100000"/>
               </a:lnSpc>
-              <a:buSzPct val="45000"/>
-              <a:buFont typeface="StarSymbol"/>
-              <a:buChar char=""/>
             </a:pPr>
             <a:endParaRPr/>
           </a:p>
@@ -5708,14 +5751,14 @@
       </p:sp>
       <p:sp>
         <p:nvSpPr>
-          <p:cNvPr id="99" name="CustomShape 3"/>
+          <p:cNvPr id="100" name="CustomShape 3"/>
           <p:cNvSpPr/>
           <p:nvPr/>
         </p:nvSpPr>
         <p:spPr>
           <a:xfrm>
             <a:off x="149040" y="692640"/>
-            <a:ext cx="7595280" cy="232560"/>
+            <a:ext cx="7594560" cy="231840"/>
           </a:xfrm>
           <a:prstGeom prst="rect">
             <a:avLst/>
@@ -5758,14 +5801,14 @@
       </p:sp>
       <p:sp>
         <p:nvSpPr>
-          <p:cNvPr id="100" name="CustomShape 4"/>
+          <p:cNvPr id="101" name="CustomShape 4"/>
           <p:cNvSpPr/>
           <p:nvPr/>
         </p:nvSpPr>
         <p:spPr>
           <a:xfrm>
             <a:off x="287280" y="6437160"/>
-            <a:ext cx="2634120" cy="362520"/>
+            <a:ext cx="2633400" cy="361800"/>
           </a:xfrm>
           <a:prstGeom prst="rect">
             <a:avLst/>
@@ -5784,14 +5827,14 @@
       </p:sp>
       <p:sp>
         <p:nvSpPr>
-          <p:cNvPr id="101" name="CustomShape 5"/>
+          <p:cNvPr id="102" name="CustomShape 5"/>
           <p:cNvSpPr/>
           <p:nvPr/>
         </p:nvSpPr>
         <p:spPr>
           <a:xfrm>
             <a:off x="7967520" y="6437160"/>
-            <a:ext cx="827640" cy="362520"/>
+            <a:ext cx="826920" cy="361800"/>
           </a:xfrm>
           <a:prstGeom prst="rect">
             <a:avLst/>
@@ -5815,7 +5858,7 @@
                 <a:spcPct val="100000"/>
               </a:lnSpc>
             </a:pPr>
-            <a:fld id="{0F935F23-6EBD-469B-A7F5-F6A51B72C3D5}" type="slidenum">
+            <a:fld id="{A057AFB1-C6D1-413B-B8AD-5EFC3079D576}" type="slidenum">
               <a:rPr lang="en-GB" sz="800" strike="noStrike">
                 <a:solidFill>
                   <a:srgbClr val="9a8b7d"/>
@@ -5831,14 +5874,14 @@
       </p:sp>
       <p:sp>
         <p:nvSpPr>
-          <p:cNvPr id="102" name="CustomShape 6"/>
+          <p:cNvPr id="103" name="CustomShape 6"/>
           <p:cNvSpPr/>
           <p:nvPr/>
         </p:nvSpPr>
         <p:spPr>
           <a:xfrm>
             <a:off x="369720" y="6058080"/>
-            <a:ext cx="8443440" cy="120600"/>
+            <a:ext cx="8442720" cy="119880"/>
           </a:xfrm>
           <a:prstGeom prst="rect">
             <a:avLst/>
@@ -5857,7 +5900,7 @@
       </p:sp>
       <p:pic>
         <p:nvPicPr>
-          <p:cNvPr id="103" name="" descr=""/>
+          <p:cNvPr id="104" name="" descr=""/>
           <p:cNvPicPr/>
           <p:nvPr/>
         </p:nvPicPr>
@@ -5868,7 +5911,7 @@
         <p:spPr>
           <a:xfrm>
             <a:off x="216000" y="6372000"/>
-            <a:ext cx="1510200" cy="446040"/>
+            <a:ext cx="1509480" cy="445320"/>
           </a:xfrm>
           <a:prstGeom prst="rect">
             <a:avLst/>
@@ -5880,7 +5923,7 @@
       </p:pic>
       <p:pic>
         <p:nvPicPr>
-          <p:cNvPr id="104" name="" descr=""/>
+          <p:cNvPr id="105" name="" descr=""/>
           <p:cNvPicPr/>
           <p:nvPr/>
         </p:nvPicPr>
@@ -5891,7 +5934,7 @@
         <p:spPr>
           <a:xfrm>
             <a:off x="7944480" y="138240"/>
-            <a:ext cx="1126080" cy="868320"/>
+            <a:ext cx="1125360" cy="867600"/>
           </a:xfrm>
           <a:prstGeom prst="rect">
             <a:avLst/>
@@ -5903,14 +5946,14 @@
       </p:pic>
       <p:sp>
         <p:nvSpPr>
-          <p:cNvPr id="105" name="CustomShape 7"/>
+          <p:cNvPr id="106" name="CustomShape 7"/>
           <p:cNvSpPr/>
           <p:nvPr/>
         </p:nvSpPr>
         <p:spPr>
           <a:xfrm>
             <a:off x="360000" y="6059520"/>
-            <a:ext cx="7486920" cy="203760"/>
+            <a:ext cx="7486200" cy="203040"/>
           </a:xfrm>
           <a:prstGeom prst="rect">
             <a:avLst/>
@@ -5948,47 +5991,29 @@
           </a:p>
         </p:txBody>
       </p:sp>
-      <p:graphicFrame>
-        <p:nvGraphicFramePr>
-          <p:cNvPr id="106" name="Object 8"/>
-          <p:cNvGraphicFramePr/>
-          <p:nvPr/>
-        </p:nvGraphicFramePr>
-        <p:xfrm>
-          <a:off x="5676840" y="1944000"/>
-          <a:ext cx="3251160" cy="3157200"/>
-        </p:xfrm>
-        <a:graphic>
-          <a:graphicData uri="http://schemas.openxmlformats.org/presentationml/2006/ole">
-            <p:oleObj name="Spreadsheet" r:id="rId3">
-              <p:embed/>
-              <p:pic>
-                <p:nvPicPr>
-                  <p:cNvPr id="107" name="" descr=""/>
-                  <p:cNvPicPr/>
-                  <p:nvPr/>
-                </p:nvPicPr>
-                <p:blipFill>
-                  <a:blip r:embed="rId4"/>
-                  <a:stretch/>
-                </p:blipFill>
-                <p:spPr>
-                  <a:xfrm>
-                    <a:off x="5676840" y="1944000"/>
-                    <a:ext cx="3251160" cy="3157200"/>
-                  </a:xfrm>
-                  <a:prstGeom prst="rect">
-                    <a:avLst/>
-                  </a:prstGeom>
-                  <a:ln>
-                    <a:noFill/>
-                  </a:ln>
-                </p:spPr>
-              </p:pic>
-            </p:oleObj>
-          </a:graphicData>
-        </a:graphic>
-      </p:graphicFrame>
+      <p:pic>
+        <p:nvPicPr>
+          <p:cNvPr id="107" name="" descr=""/>
+          <p:cNvPicPr/>
+          <p:nvPr/>
+        </p:nvPicPr>
+        <p:blipFill>
+          <a:blip r:embed="rId3"/>
+          <a:stretch/>
+        </p:blipFill>
+        <p:spPr>
+          <a:xfrm>
+            <a:off x="5624640" y="2052000"/>
+            <a:ext cx="3411360" cy="3093480"/>
+          </a:xfrm>
+          <a:prstGeom prst="rect">
+            <a:avLst/>
+          </a:prstGeom>
+          <a:ln>
+            <a:noFill/>
+          </a:ln>
+        </p:spPr>
+      </p:pic>
     </p:spTree>
   </p:cSld>
   <p:timing>
@@ -6047,7 +6072,7 @@
         <p:spPr>
           <a:xfrm>
             <a:off x="365040" y="294840"/>
-            <a:ext cx="7574760" cy="335880"/>
+            <a:ext cx="7574040" cy="335160"/>
           </a:xfrm>
           <a:prstGeom prst="rect">
             <a:avLst/>
@@ -6094,7 +6119,7 @@
         <p:spPr>
           <a:xfrm>
             <a:off x="365040" y="1383480"/>
-            <a:ext cx="6041880" cy="4267440"/>
+            <a:ext cx="6041160" cy="4266720"/>
           </a:xfrm>
           <a:prstGeom prst="rect">
             <a:avLst/>
@@ -6515,7 +6540,7 @@
         <p:spPr>
           <a:xfrm>
             <a:off x="149040" y="692640"/>
-            <a:ext cx="7595280" cy="232560"/>
+            <a:ext cx="7594560" cy="231840"/>
           </a:xfrm>
           <a:prstGeom prst="rect">
             <a:avLst/>
@@ -6565,7 +6590,7 @@
         <p:spPr>
           <a:xfrm>
             <a:off x="7967520" y="6437160"/>
-            <a:ext cx="827640" cy="362520"/>
+            <a:ext cx="826920" cy="361800"/>
           </a:xfrm>
           <a:prstGeom prst="rect">
             <a:avLst/>
@@ -6589,7 +6614,7 @@
                 <a:spcPct val="100000"/>
               </a:lnSpc>
             </a:pPr>
-            <a:fld id="{DB265917-B993-4F2A-AD64-BC84956949FA}" type="slidenum">
+            <a:fld id="{2A185F69-5D9C-457C-BCE2-20026CDA3288}" type="slidenum">
               <a:rPr lang="en-GB" sz="800" strike="noStrike">
                 <a:solidFill>
                   <a:srgbClr val="9a8b7d"/>
@@ -6612,7 +6637,7 @@
         <p:spPr>
           <a:xfrm>
             <a:off x="369720" y="6058080"/>
-            <a:ext cx="8443440" cy="120600"/>
+            <a:ext cx="8442720" cy="119880"/>
           </a:xfrm>
           <a:prstGeom prst="rect">
             <a:avLst/>
@@ -6642,7 +6667,7 @@
         <p:spPr>
           <a:xfrm>
             <a:off x="216000" y="6372000"/>
-            <a:ext cx="1510200" cy="446040"/>
+            <a:ext cx="1509480" cy="445320"/>
           </a:xfrm>
           <a:prstGeom prst="rect">
             <a:avLst/>
@@ -6665,7 +6690,7 @@
         <p:spPr>
           <a:xfrm>
             <a:off x="7944480" y="138240"/>
-            <a:ext cx="1126080" cy="868320"/>
+            <a:ext cx="1125360" cy="867600"/>
           </a:xfrm>
           <a:prstGeom prst="rect">
             <a:avLst/>
@@ -6684,7 +6709,7 @@
         <p:spPr>
           <a:xfrm>
             <a:off x="288000" y="5976000"/>
-            <a:ext cx="8350920" cy="318240"/>
+            <a:ext cx="8350200" cy="317520"/>
           </a:xfrm>
           <a:prstGeom prst="rect">
             <a:avLst/>
@@ -6734,8 +6759,8 @@
         </p:blipFill>
         <p:spPr>
           <a:xfrm>
-            <a:off x="6408000" y="3101760"/>
-            <a:ext cx="2739600" cy="2297160"/>
+            <a:off x="6264000" y="3384000"/>
+            <a:ext cx="2835360" cy="2376000"/>
           </a:xfrm>
           <a:prstGeom prst="rect">
             <a:avLst/>
@@ -6757,8 +6782,8 @@
         </p:blipFill>
         <p:spPr>
           <a:xfrm>
-            <a:off x="6372000" y="1383120"/>
-            <a:ext cx="2775600" cy="1855800"/>
+            <a:off x="6380280" y="1656000"/>
+            <a:ext cx="2619720" cy="1530000"/>
           </a:xfrm>
           <a:prstGeom prst="rect">
             <a:avLst/>
@@ -6826,7 +6851,7 @@
         <p:spPr>
           <a:xfrm>
             <a:off x="365040" y="294840"/>
-            <a:ext cx="7574760" cy="335880"/>
+            <a:ext cx="7574040" cy="335160"/>
           </a:xfrm>
           <a:prstGeom prst="rect">
             <a:avLst/>
@@ -6873,7 +6898,7 @@
         <p:spPr>
           <a:xfrm>
             <a:off x="365040" y="1383480"/>
-            <a:ext cx="6041880" cy="4267440"/>
+            <a:ext cx="6041160" cy="4266720"/>
           </a:xfrm>
           <a:prstGeom prst="rect">
             <a:avLst/>
@@ -6899,7 +6924,7 @@
         <p:spPr>
           <a:xfrm>
             <a:off x="149040" y="692640"/>
-            <a:ext cx="7595280" cy="232560"/>
+            <a:ext cx="7594560" cy="231840"/>
           </a:xfrm>
           <a:prstGeom prst="rect">
             <a:avLst/>
@@ -6949,7 +6974,7 @@
         <p:spPr>
           <a:xfrm>
             <a:off x="7967520" y="6437160"/>
-            <a:ext cx="827640" cy="362520"/>
+            <a:ext cx="826920" cy="361800"/>
           </a:xfrm>
           <a:prstGeom prst="rect">
             <a:avLst/>
@@ -6973,7 +6998,7 @@
                 <a:spcPct val="100000"/>
               </a:lnSpc>
             </a:pPr>
-            <a:fld id="{0AA55420-416A-4717-B028-62BB44FA5CE2}" type="slidenum">
+            <a:fld id="{ED0F4538-A496-41E6-911F-80032953E8CC}" type="slidenum">
               <a:rPr lang="en-GB" sz="800" strike="noStrike">
                 <a:solidFill>
                   <a:srgbClr val="9a8b7d"/>
@@ -6996,7 +7021,7 @@
         <p:spPr>
           <a:xfrm>
             <a:off x="369720" y="6058080"/>
-            <a:ext cx="8443440" cy="120600"/>
+            <a:ext cx="8442720" cy="119880"/>
           </a:xfrm>
           <a:prstGeom prst="rect">
             <a:avLst/>
@@ -7026,7 +7051,7 @@
         <p:spPr>
           <a:xfrm>
             <a:off x="216000" y="6372000"/>
-            <a:ext cx="1510200" cy="446040"/>
+            <a:ext cx="1509480" cy="445320"/>
           </a:xfrm>
           <a:prstGeom prst="rect">
             <a:avLst/>
@@ -7049,7 +7074,7 @@
         <p:spPr>
           <a:xfrm>
             <a:off x="7944480" y="138240"/>
-            <a:ext cx="1126080" cy="868320"/>
+            <a:ext cx="1125360" cy="867600"/>
           </a:xfrm>
           <a:prstGeom prst="rect">
             <a:avLst/>
@@ -7068,7 +7093,7 @@
         <p:spPr>
           <a:xfrm>
             <a:off x="288000" y="5976000"/>
-            <a:ext cx="8350920" cy="318240"/>
+            <a:ext cx="8350200" cy="317520"/>
           </a:xfrm>
           <a:prstGeom prst="rect">
             <a:avLst/>
@@ -7108,14 +7133,14 @@
       </p:sp>
       <p:sp>
         <p:nvSpPr>
-          <p:cNvPr id="126" name="TextShape 7"/>
-          <p:cNvSpPr txBox="1"/>
+          <p:cNvPr id="126" name="CustomShape 7"/>
+          <p:cNvSpPr/>
           <p:nvPr/>
         </p:nvSpPr>
         <p:spPr>
           <a:xfrm>
             <a:off x="360000" y="1368000"/>
-            <a:ext cx="8424000" cy="3087360"/>
+            <a:ext cx="8423280" cy="3086640"/>
           </a:xfrm>
           <a:prstGeom prst="rect">
             <a:avLst/>
@@ -7125,18 +7150,32 @@
             <a:noFill/>
           </a:ln>
         </p:spPr>
+        <p:style>
+          <a:lnRef idx="0"/>
+          <a:fillRef idx="0"/>
+          <a:effectRef idx="0"/>
+          <a:fontRef idx="minor"/>
+        </p:style>
         <p:txBody>
           <a:bodyPr lIns="90000" rIns="90000" tIns="45000" bIns="45000"/>
           <a:p>
             <a:r>
-              <a:rPr b="1" lang="en-GB" sz="1400">
-                <a:latin typeface="Arial"/>
+              <a:rPr b="1" lang="en-GB" sz="1400" strike="noStrike">
+                <a:solidFill>
+                  <a:srgbClr val="000000"/>
+                </a:solidFill>
+                <a:latin typeface="Arial"/>
+                <a:ea typeface="DejaVu Sans"/>
               </a:rPr>
               <a:t>Research Question:</a:t>
             </a:r>
             <a:r>
-              <a:rPr lang="en-GB" sz="1400">
-                <a:latin typeface="Arial"/>
+              <a:rPr lang="en-GB" sz="1400" strike="noStrike">
+                <a:solidFill>
+                  <a:srgbClr val="000000"/>
+                </a:solidFill>
+                <a:latin typeface="Arial"/>
+                <a:ea typeface="DejaVu Sans"/>
               </a:rPr>
               <a:t> </a:t>
             </a:r>
@@ -7146,45 +7185,83 @@
             <a:endParaRPr/>
           </a:p>
           <a:p>
-            <a:pPr algn="ctr"/>
-            <a:r>
-              <a:rPr lang="en-GB" sz="1400">
-                <a:latin typeface="Arial"/>
+            <a:pPr algn="ctr">
+              <a:lnSpc>
+                <a:spcPct val="100000"/>
+              </a:lnSpc>
+            </a:pPr>
+            <a:r>
+              <a:rPr lang="en-GB" sz="1400" strike="noStrike">
+                <a:solidFill>
+                  <a:srgbClr val="000000"/>
+                </a:solidFill>
+                <a:latin typeface="Arial"/>
+                <a:ea typeface="DejaVu Sans"/>
               </a:rPr>
               <a:t>“</a:t>
             </a:r>
             <a:r>
-              <a:rPr lang="en-GB" sz="1400">
-                <a:latin typeface="Arial"/>
-              </a:rPr>
-              <a:t>Compare the variations in athlete scores to identify cohorts of high performance?”</a:t>
-            </a:r>
-            <a:endParaRPr/>
-          </a:p>
-          <a:p>
-            <a:endParaRPr/>
-          </a:p>
-          <a:p>
-            <a:r>
-              <a:rPr b="1" lang="en-GB" sz="1400">
-                <a:latin typeface="Arial"/>
+              <a:rPr lang="en-GB" sz="1400" strike="noStrike">
+                <a:solidFill>
+                  <a:srgbClr val="000000"/>
+                </a:solidFill>
+                <a:latin typeface="Arial"/>
+                <a:ea typeface="DejaVu Sans"/>
+              </a:rPr>
+              <a:t>Compare the variations in athlete scores to identify cohorts of high performance”</a:t>
+            </a:r>
+            <a:endParaRPr/>
+          </a:p>
+          <a:p>
+            <a:pPr>
+              <a:lnSpc>
+                <a:spcPct val="100000"/>
+              </a:lnSpc>
+            </a:pPr>
+            <a:endParaRPr/>
+          </a:p>
+          <a:p>
+            <a:pPr>
+              <a:lnSpc>
+                <a:spcPct val="100000"/>
+              </a:lnSpc>
+            </a:pPr>
+            <a:r>
+              <a:rPr b="1" lang="en-GB" sz="1400" strike="noStrike">
+                <a:solidFill>
+                  <a:srgbClr val="000000"/>
+                </a:solidFill>
+                <a:latin typeface="Arial"/>
+                <a:ea typeface="DejaVu Sans"/>
               </a:rPr>
               <a:t>Intermediate Questions</a:t>
             </a:r>
             <a:endParaRPr/>
           </a:p>
           <a:p>
+            <a:pPr algn="ctr">
+              <a:lnSpc>
+                <a:spcPct val="100000"/>
+              </a:lnSpc>
+            </a:pPr>
             <a:endParaRPr/>
           </a:p>
           <a:p>
             <a:pPr>
+              <a:lnSpc>
+                <a:spcPct val="100000"/>
+              </a:lnSpc>
               <a:buSzPct val="45000"/>
               <a:buFont typeface="StarSymbol"/>
-              <a:buChar char=""/>
-            </a:pPr>
-            <a:r>
-              <a:rPr lang="en-GB" sz="1400">
-                <a:latin typeface="Arial"/>
+              <a:buChar char="l"/>
+            </a:pPr>
+            <a:r>
+              <a:rPr lang="en-GB" sz="1400" strike="noStrike">
+                <a:solidFill>
+                  <a:srgbClr val="000000"/>
+                </a:solidFill>
+                <a:latin typeface="Arial"/>
+                <a:ea typeface="DejaVu Sans"/>
               </a:rPr>
               <a:t>Who are the top individuals globally and by region? Are they comparative and exhibit the same types of characteristics?</a:t>
             </a:r>
@@ -7192,13 +7269,20 @@
           </a:p>
           <a:p>
             <a:pPr>
+              <a:lnSpc>
+                <a:spcPct val="100000"/>
+              </a:lnSpc>
               <a:buSzPct val="45000"/>
               <a:buFont typeface="StarSymbol"/>
-              <a:buChar char=""/>
-            </a:pPr>
-            <a:r>
-              <a:rPr lang="en-GB" sz="1400">
-                <a:latin typeface="Arial"/>
+              <a:buChar char="l"/>
+            </a:pPr>
+            <a:r>
+              <a:rPr lang="en-GB" sz="1400" strike="noStrike">
+                <a:solidFill>
+                  <a:srgbClr val="000000"/>
+                </a:solidFill>
+                <a:latin typeface="Arial"/>
+                <a:ea typeface="DejaVu Sans"/>
               </a:rPr>
               <a:t>How does the drop of participation of each of the Open events distort the comparison of athletes?</a:t>
             </a:r>
@@ -7206,13 +7290,20 @@
           </a:p>
           <a:p>
             <a:pPr>
+              <a:lnSpc>
+                <a:spcPct val="100000"/>
+              </a:lnSpc>
               <a:buSzPct val="45000"/>
               <a:buFont typeface="StarSymbol"/>
-              <a:buChar char=""/>
-            </a:pPr>
-            <a:r>
-              <a:rPr lang="en-GB" sz="1400">
-                <a:latin typeface="Arial"/>
+              <a:buChar char="l"/>
+            </a:pPr>
+            <a:r>
+              <a:rPr lang="en-GB" sz="1400" strike="noStrike">
+                <a:solidFill>
+                  <a:srgbClr val="000000"/>
+                </a:solidFill>
+                <a:latin typeface="Arial"/>
+                <a:ea typeface="DejaVu Sans"/>
               </a:rPr>
               <a:t>What key features do the top athletes have that the less competitive do not?</a:t>
             </a:r>
@@ -7220,13 +7311,20 @@
           </a:p>
           <a:p>
             <a:pPr>
+              <a:lnSpc>
+                <a:spcPct val="100000"/>
+              </a:lnSpc>
               <a:buSzPct val="45000"/>
               <a:buFont typeface="StarSymbol"/>
-              <a:buChar char=""/>
-            </a:pPr>
-            <a:r>
-              <a:rPr lang="en-GB" sz="1400">
-                <a:latin typeface="Arial"/>
+              <a:buChar char="l"/>
+            </a:pPr>
+            <a:r>
+              <a:rPr lang="en-GB" sz="1400" strike="noStrike">
+                <a:solidFill>
+                  <a:srgbClr val="000000"/>
+                </a:solidFill>
+                <a:latin typeface="Arial"/>
+                <a:ea typeface="DejaVu Sans"/>
               </a:rPr>
               <a:t>How do gender, height and weight relate to the performance of athletes in the Crossfit Open competition?</a:t>
             </a:r>
@@ -7234,16 +7332,25 @@
           </a:p>
           <a:p>
             <a:pPr>
-              <a:buSzPct val="45000"/>
-              <a:buFont typeface="StarSymbol"/>
-              <a:buChar char=""/>
-            </a:pPr>
-            <a:endParaRPr/>
-          </a:p>
-          <a:p>
-            <a:r>
-              <a:rPr lang="en-GB" sz="1400">
-                <a:latin typeface="Arial"/>
+              <a:lnSpc>
+                <a:spcPct val="100000"/>
+              </a:lnSpc>
+            </a:pPr>
+            <a:endParaRPr/>
+          </a:p>
+          <a:p>
+            <a:pPr>
+              <a:lnSpc>
+                <a:spcPct val="100000"/>
+              </a:lnSpc>
+            </a:pPr>
+            <a:r>
+              <a:rPr lang="en-GB" sz="1400" strike="noStrike">
+                <a:solidFill>
+                  <a:srgbClr val="000000"/>
+                </a:solidFill>
+                <a:latin typeface="Arial"/>
+                <a:ea typeface="DejaVu Sans"/>
               </a:rPr>
               <a:t>It is expected that during the analysis that further questions (elementary and intermediate) will arise as a result of these pre-determined questions.</a:t>
             </a:r>
@@ -7309,7 +7416,7 @@
         <p:spPr>
           <a:xfrm>
             <a:off x="365040" y="294840"/>
-            <a:ext cx="7574760" cy="335880"/>
+            <a:ext cx="7574040" cy="335160"/>
           </a:xfrm>
           <a:prstGeom prst="rect">
             <a:avLst/>
@@ -7356,7 +7463,7 @@
         <p:spPr>
           <a:xfrm>
             <a:off x="149040" y="692640"/>
-            <a:ext cx="7595280" cy="232560"/>
+            <a:ext cx="7594560" cy="231840"/>
           </a:xfrm>
           <a:prstGeom prst="rect">
             <a:avLst/>
@@ -7406,7 +7513,7 @@
         <p:spPr>
           <a:xfrm>
             <a:off x="7967520" y="6437160"/>
-            <a:ext cx="827640" cy="362520"/>
+            <a:ext cx="826920" cy="361800"/>
           </a:xfrm>
           <a:prstGeom prst="rect">
             <a:avLst/>
@@ -7430,7 +7537,7 @@
                 <a:spcPct val="100000"/>
               </a:lnSpc>
             </a:pPr>
-            <a:fld id="{06EF6198-9247-4634-90B0-1E0696A14A31}" type="slidenum">
+            <a:fld id="{64BE5363-4564-4088-93A5-3C866C5A8048}" type="slidenum">
               <a:rPr lang="en-GB" sz="800" strike="noStrike">
                 <a:solidFill>
                   <a:srgbClr val="9a8b7d"/>
@@ -7453,7 +7560,7 @@
         <p:spPr>
           <a:xfrm>
             <a:off x="369720" y="6058080"/>
-            <a:ext cx="8443440" cy="120600"/>
+            <a:ext cx="8442720" cy="119880"/>
           </a:xfrm>
           <a:prstGeom prst="rect">
             <a:avLst/>
@@ -7483,7 +7590,7 @@
         <p:spPr>
           <a:xfrm>
             <a:off x="216000" y="6372000"/>
-            <a:ext cx="1510200" cy="446040"/>
+            <a:ext cx="1509480" cy="445320"/>
           </a:xfrm>
           <a:prstGeom prst="rect">
             <a:avLst/>
@@ -7506,7 +7613,7 @@
         <p:spPr>
           <a:xfrm>
             <a:off x="7944480" y="138240"/>
-            <a:ext cx="1126080" cy="868320"/>
+            <a:ext cx="1125360" cy="867600"/>
           </a:xfrm>
           <a:prstGeom prst="rect">
             <a:avLst/>
@@ -7518,14 +7625,14 @@
       </p:pic>
       <p:sp>
         <p:nvSpPr>
-          <p:cNvPr id="133" name="TextShape 5"/>
-          <p:cNvSpPr txBox="1"/>
+          <p:cNvPr id="133" name="CustomShape 5"/>
+          <p:cNvSpPr/>
           <p:nvPr/>
         </p:nvSpPr>
         <p:spPr>
           <a:xfrm>
             <a:off x="288000" y="6120000"/>
-            <a:ext cx="6192000" cy="206280"/>
+            <a:ext cx="6191280" cy="205560"/>
           </a:xfrm>
           <a:prstGeom prst="rect">
             <a:avLst/>
@@ -7535,6 +7642,12 @@
             <a:noFill/>
           </a:ln>
         </p:spPr>
+        <p:style>
+          <a:lnRef idx="0"/>
+          <a:fillRef idx="0"/>
+          <a:effectRef idx="0"/>
+          <a:fontRef idx="minor"/>
+        </p:style>
         <p:txBody>
           <a:bodyPr lIns="90000" rIns="90000" tIns="45000" bIns="45000"/>
           <a:p>
@@ -7559,14 +7672,14 @@
       </p:sp>
       <p:sp>
         <p:nvSpPr>
-          <p:cNvPr id="134" name="TextShape 6"/>
-          <p:cNvSpPr txBox="1"/>
-          <p:nvPr/>
-        </p:nvSpPr>
-        <p:spPr>
-          <a:xfrm>
-            <a:off x="360000" y="1080000"/>
-            <a:ext cx="8424000" cy="4329720"/>
+          <p:cNvPr id="134" name="CustomShape 6"/>
+          <p:cNvSpPr/>
+          <p:nvPr/>
+        </p:nvSpPr>
+        <p:spPr>
+          <a:xfrm>
+            <a:off x="360000" y="1188000"/>
+            <a:ext cx="8423280" cy="4329000"/>
           </a:xfrm>
           <a:prstGeom prst="rect">
             <a:avLst/>
@@ -7576,12 +7689,18 @@
             <a:noFill/>
           </a:ln>
         </p:spPr>
+        <p:style>
+          <a:lnRef idx="0"/>
+          <a:fillRef idx="0"/>
+          <a:effectRef idx="0"/>
+          <a:fontRef idx="minor"/>
+        </p:style>
         <p:txBody>
           <a:bodyPr lIns="90000" rIns="90000" tIns="45000" bIns="45000"/>
           <a:p>
             <a:pPr algn="ctr">
               <a:lnSpc>
-                <a:spcPts val="8"/>
+                <a:spcPts val="1"/>
               </a:lnSpc>
             </a:pPr>
             <a:r>
@@ -7599,7 +7718,7 @@
           <a:p>
             <a:pPr>
               <a:lnSpc>
-                <a:spcPts val="8"/>
+                <a:spcPts val="1"/>
               </a:lnSpc>
             </a:pPr>
             <a:endParaRPr/>
@@ -7607,7 +7726,7 @@
           <a:p>
             <a:pPr>
               <a:lnSpc>
-                <a:spcPts val="8"/>
+                <a:spcPts val="1"/>
               </a:lnSpc>
             </a:pPr>
             <a:r>
@@ -7645,11 +7764,11 @@
           <a:p>
             <a:pPr lvl="1">
               <a:lnSpc>
-                <a:spcPts val="8"/>
+                <a:spcPts val="1"/>
               </a:lnSpc>
               <a:buSzPct val="45000"/>
               <a:buFont typeface="StarSymbol"/>
-              <a:buChar char=""/>
+              <a:buChar char="l"/>
             </a:pPr>
             <a:r>
               <a:rPr lang="en-GB" sz="1300" strike="noStrike">
@@ -7676,7 +7795,7 @@
           <a:p>
             <a:pPr>
               <a:lnSpc>
-                <a:spcPts val="8"/>
+                <a:spcPts val="1"/>
               </a:lnSpc>
             </a:pPr>
             <a:endParaRPr/>
@@ -7684,7 +7803,7 @@
           <a:p>
             <a:pPr>
               <a:lnSpc>
-                <a:spcPts val="8"/>
+                <a:spcPts val="1"/>
               </a:lnSpc>
             </a:pPr>
             <a:r>
@@ -7722,11 +7841,11 @@
           <a:p>
             <a:pPr lvl="1">
               <a:lnSpc>
-                <a:spcPts val="8"/>
+                <a:spcPts val="1"/>
               </a:lnSpc>
               <a:buSzPct val="45000"/>
               <a:buFont typeface="StarSymbol"/>
-              <a:buChar char=""/>
+              <a:buChar char="l"/>
             </a:pPr>
             <a:r>
               <a:rPr lang="en-GB" sz="1300" strike="noStrike">
@@ -7753,11 +7872,11 @@
           <a:p>
             <a:pPr lvl="1">
               <a:lnSpc>
-                <a:spcPts val="8"/>
+                <a:spcPts val="1"/>
               </a:lnSpc>
               <a:buSzPct val="45000"/>
               <a:buFont typeface="StarSymbol"/>
-              <a:buChar char=""/>
+              <a:buChar char="l"/>
             </a:pPr>
             <a:r>
               <a:rPr lang="en-GB" sz="1300" strike="noStrike">
@@ -7784,11 +7903,11 @@
           <a:p>
             <a:pPr lvl="1">
               <a:lnSpc>
-                <a:spcPts val="8"/>
+                <a:spcPts val="1"/>
               </a:lnSpc>
               <a:buSzPct val="45000"/>
               <a:buFont typeface="StarSymbol"/>
-              <a:buChar char=""/>
+              <a:buChar char="l"/>
             </a:pPr>
             <a:r>
               <a:rPr lang="en-GB" sz="1300" strike="noStrike">
@@ -7815,7 +7934,7 @@
           <a:p>
             <a:pPr>
               <a:lnSpc>
-                <a:spcPts val="8"/>
+                <a:spcPts val="1"/>
               </a:lnSpc>
             </a:pPr>
             <a:endParaRPr/>
@@ -7823,7 +7942,7 @@
           <a:p>
             <a:pPr>
               <a:lnSpc>
-                <a:spcPts val="8"/>
+                <a:spcPts val="1"/>
               </a:lnSpc>
             </a:pPr>
             <a:r>
@@ -7861,11 +7980,11 @@
           <a:p>
             <a:pPr lvl="1">
               <a:lnSpc>
-                <a:spcPts val="8"/>
+                <a:spcPts val="1"/>
               </a:lnSpc>
               <a:buSzPct val="45000"/>
               <a:buFont typeface="StarSymbol"/>
-              <a:buChar char=""/>
+              <a:buChar char="l"/>
             </a:pPr>
             <a:r>
               <a:rPr lang="en-GB" sz="1300" strike="noStrike">
@@ -7912,11 +8031,11 @@
           <a:p>
             <a:pPr lvl="1">
               <a:lnSpc>
-                <a:spcPts val="8"/>
+                <a:spcPts val="1"/>
               </a:lnSpc>
               <a:buSzPct val="45000"/>
               <a:buFont typeface="StarSymbol"/>
-              <a:buChar char=""/>
+              <a:buChar char="l"/>
             </a:pPr>
             <a:r>
               <a:rPr lang="en-GB" sz="1300" strike="noStrike">
@@ -7943,11 +8062,11 @@
           <a:p>
             <a:pPr lvl="1">
               <a:lnSpc>
-                <a:spcPts val="8"/>
+                <a:spcPts val="1"/>
               </a:lnSpc>
               <a:buSzPct val="45000"/>
               <a:buFont typeface="StarSymbol"/>
-              <a:buChar char=""/>
+              <a:buChar char="l"/>
             </a:pPr>
             <a:r>
               <a:rPr lang="en-GB" sz="1300" strike="noStrike">
@@ -7972,20 +8091,94 @@
             <a:endParaRPr/>
           </a:p>
           <a:p>
+            <a:pPr>
+              <a:lnSpc>
+                <a:spcPts val="1"/>
+              </a:lnSpc>
+            </a:pPr>
+            <a:endParaRPr/>
+          </a:p>
+          <a:p>
+            <a:pPr>
+              <a:lnSpc>
+                <a:spcPts val="1"/>
+              </a:lnSpc>
+            </a:pPr>
+            <a:r>
+              <a:rPr b="1" lang="en-GB" sz="1300" strike="noStrike">
+                <a:solidFill>
+                  <a:srgbClr val="000000"/>
+                </a:solidFill>
+                <a:latin typeface="Arial"/>
+                <a:ea typeface="DejaVu Sans"/>
+              </a:rPr>
+              <a:t>4.</a:t>
+            </a:r>
+            <a:r>
+              <a:rPr b="1" lang="en-GB" sz="1300" strike="noStrike">
+                <a:solidFill>
+                  <a:srgbClr val="000000"/>
+                </a:solidFill>
+                <a:latin typeface="Arial"/>
+                <a:ea typeface="DejaVu Sans"/>
+              </a:rPr>
+              <a:t>	</a:t>
+            </a:r>
+            <a:r>
+              <a:rPr b="1" lang="en-GB" sz="1300" strike="noStrike">
+                <a:solidFill>
+                  <a:srgbClr val="000000"/>
+                </a:solidFill>
+                <a:latin typeface="Arial"/>
+                <a:ea typeface="DejaVu Sans"/>
+              </a:rPr>
+              <a:t>Exploring the findings iteratively through interaction</a:t>
+            </a:r>
+            <a:endParaRPr/>
+          </a:p>
+          <a:p>
             <a:pPr lvl="1">
               <a:lnSpc>
-                <a:spcPts val="8"/>
+                <a:spcPts val="1"/>
               </a:lnSpc>
               <a:buSzPct val="45000"/>
               <a:buFont typeface="StarSymbol"/>
-              <a:buChar char=""/>
-            </a:pPr>
+              <a:buChar char="l"/>
+            </a:pPr>
+            <a:r>
+              <a:rPr lang="en-GB" sz="1300" strike="noStrike">
+                <a:solidFill>
+                  <a:srgbClr val="000000"/>
+                </a:solidFill>
+                <a:latin typeface="Arial"/>
+                <a:ea typeface="DejaVu Sans"/>
+              </a:rPr>
+              <a:t>Human and Computer Labour - </a:t>
+            </a:r>
+            <a:r>
+              <a:rPr i="1" lang="en-GB" sz="1300" strike="noStrike">
+                <a:solidFill>
+                  <a:srgbClr val="000000"/>
+                </a:solidFill>
+                <a:latin typeface="Arial"/>
+                <a:ea typeface="DejaVu Sans"/>
+              </a:rPr>
+              <a:t>It is expected that navigating many times between phase 1-3</a:t>
+            </a:r>
             <a:endParaRPr/>
           </a:p>
           <a:p>
             <a:pPr>
               <a:lnSpc>
-                <a:spcPts val="8"/>
+                <a:spcPts val="1"/>
+              </a:lnSpc>
+            </a:pPr>
+            <a:endParaRPr/>
+          </a:p>
+          <a:p>
+            <a:pPr>
+              <a:lnSpc>
+                <a:spcPts val="1"/>
               </a:lnSpc>
             </a:pPr>
             <a:r>
@@ -7996,7 +8189,7 @@
                 <a:latin typeface="Arial"/>
                 <a:ea typeface="DejaVu Sans"/>
               </a:rPr>
-              <a:t>4.</a:t>
+              <a:t>5.</a:t>
             </a:r>
             <a:r>
               <a:rPr b="1" lang="en-GB" sz="1300" strike="noStrike">
@@ -8016,98 +8209,18 @@
                 <a:latin typeface="Arial"/>
                 <a:ea typeface="DejaVu Sans"/>
               </a:rPr>
-              <a:t>Exploring the findings iteratively through interaction</a:t>
+              <a:t>Final presentation</a:t>
             </a:r>
             <a:endParaRPr/>
           </a:p>
           <a:p>
             <a:pPr lvl="1">
               <a:lnSpc>
-                <a:spcPts val="8"/>
+                <a:spcPts val="1"/>
               </a:lnSpc>
               <a:buSzPct val="45000"/>
               <a:buFont typeface="StarSymbol"/>
-              <a:buChar char=""/>
-            </a:pPr>
-            <a:r>
-              <a:rPr lang="en-GB" sz="1300" strike="noStrike">
-                <a:solidFill>
-                  <a:srgbClr val="000000"/>
-                </a:solidFill>
-                <a:latin typeface="Arial"/>
-                <a:ea typeface="DejaVu Sans"/>
-              </a:rPr>
-              <a:t>Human and Computer Labour - </a:t>
-            </a:r>
-            <a:r>
-              <a:rPr i="1" lang="en-GB" sz="1300" strike="noStrike">
-                <a:solidFill>
-                  <a:srgbClr val="000000"/>
-                </a:solidFill>
-                <a:latin typeface="Arial"/>
-                <a:ea typeface="DejaVu Sans"/>
-              </a:rPr>
-              <a:t>It is expected that navigating many times between phase 1-3</a:t>
-            </a:r>
-            <a:endParaRPr/>
-          </a:p>
-          <a:p>
-            <a:pPr lvl="1">
-              <a:lnSpc>
-                <a:spcPts val="8"/>
-              </a:lnSpc>
-              <a:buSzPct val="45000"/>
-              <a:buFont typeface="StarSymbol"/>
-              <a:buChar char=""/>
-            </a:pPr>
-            <a:endParaRPr/>
-          </a:p>
-          <a:p>
-            <a:pPr>
-              <a:lnSpc>
-                <a:spcPts val="8"/>
-              </a:lnSpc>
-            </a:pPr>
-            <a:r>
-              <a:rPr b="1" lang="en-GB" sz="1300" strike="noStrike">
-                <a:solidFill>
-                  <a:srgbClr val="000000"/>
-                </a:solidFill>
-                <a:latin typeface="Arial"/>
-                <a:ea typeface="DejaVu Sans"/>
-              </a:rPr>
-              <a:t>5.</a:t>
-            </a:r>
-            <a:r>
-              <a:rPr b="1" lang="en-GB" sz="1300" strike="noStrike">
-                <a:solidFill>
-                  <a:srgbClr val="000000"/>
-                </a:solidFill>
-                <a:latin typeface="Arial"/>
-                <a:ea typeface="DejaVu Sans"/>
-              </a:rPr>
-              <a:t>	</a:t>
-            </a:r>
-            <a:r>
-              <a:rPr b="1" lang="en-GB" sz="1300" strike="noStrike">
-                <a:solidFill>
-                  <a:srgbClr val="000000"/>
-                </a:solidFill>
-                <a:latin typeface="Arial"/>
-                <a:ea typeface="DejaVu Sans"/>
-              </a:rPr>
-              <a:t>Final presentation</a:t>
-            </a:r>
-            <a:endParaRPr/>
-          </a:p>
-          <a:p>
-            <a:pPr lvl="1">
-              <a:lnSpc>
-                <a:spcPts val="8"/>
-              </a:lnSpc>
-              <a:buSzPct val="45000"/>
-              <a:buFont typeface="StarSymbol"/>
-              <a:buChar char=""/>
+              <a:buChar char="l"/>
             </a:pPr>
             <a:r>
               <a:rPr lang="en-GB" sz="1300" strike="noStrike">
@@ -8199,7 +8312,7 @@
         <p:spPr>
           <a:xfrm>
             <a:off x="365040" y="294840"/>
-            <a:ext cx="7574760" cy="335880"/>
+            <a:ext cx="7574040" cy="335160"/>
           </a:xfrm>
           <a:prstGeom prst="rect">
             <a:avLst/>
@@ -8246,7 +8359,7 @@
         <p:spPr>
           <a:xfrm>
             <a:off x="149040" y="692640"/>
-            <a:ext cx="7595280" cy="232560"/>
+            <a:ext cx="7594560" cy="231840"/>
           </a:xfrm>
           <a:prstGeom prst="rect">
             <a:avLst/>
@@ -8296,7 +8409,7 @@
         <p:spPr>
           <a:xfrm>
             <a:off x="7967520" y="6437160"/>
-            <a:ext cx="827640" cy="362520"/>
+            <a:ext cx="826920" cy="361800"/>
           </a:xfrm>
           <a:prstGeom prst="rect">
             <a:avLst/>
@@ -8320,7 +8433,7 @@
                 <a:spcPct val="100000"/>
               </a:lnSpc>
             </a:pPr>
-            <a:fld id="{76D8E311-796C-48AB-872F-2D184CD5168B}" type="slidenum">
+            <a:fld id="{F403CA15-8CFA-4AEF-A31A-3E877D2FF32B}" type="slidenum">
               <a:rPr lang="en-GB" sz="800" strike="noStrike">
                 <a:solidFill>
                   <a:srgbClr val="9a8b7d"/>
@@ -8343,7 +8456,7 @@
         <p:spPr>
           <a:xfrm>
             <a:off x="369720" y="6058080"/>
-            <a:ext cx="8443440" cy="120600"/>
+            <a:ext cx="8442720" cy="119880"/>
           </a:xfrm>
           <a:prstGeom prst="rect">
             <a:avLst/>
@@ -8373,7 +8486,7 @@
         <p:spPr>
           <a:xfrm>
             <a:off x="216000" y="6372000"/>
-            <a:ext cx="1510200" cy="446040"/>
+            <a:ext cx="1509480" cy="445320"/>
           </a:xfrm>
           <a:prstGeom prst="rect">
             <a:avLst/>
@@ -8396,7 +8509,7 @@
         <p:spPr>
           <a:xfrm>
             <a:off x="7944480" y="138240"/>
-            <a:ext cx="1126080" cy="868320"/>
+            <a:ext cx="1125360" cy="867600"/>
           </a:xfrm>
           <a:prstGeom prst="rect">
             <a:avLst/>
@@ -8415,7 +8528,7 @@
         <p:spPr>
           <a:xfrm>
             <a:off x="288000" y="6084000"/>
-            <a:ext cx="8422920" cy="203760"/>
+            <a:ext cx="8422200" cy="203040"/>
           </a:xfrm>
           <a:prstGeom prst="rect">
             <a:avLst/>
@@ -8466,7 +8579,7 @@
         <p:spPr>
           <a:xfrm>
             <a:off x="2772000" y="1572840"/>
-            <a:ext cx="3707280" cy="3250440"/>
+            <a:ext cx="3706560" cy="3249720"/>
           </a:xfrm>
           <a:prstGeom prst="rect">
             <a:avLst/>
@@ -8489,7 +8602,7 @@
         <p:spPr>
           <a:xfrm>
             <a:off x="6192000" y="2520000"/>
-            <a:ext cx="2015280" cy="575280"/>
+            <a:ext cx="2014560" cy="574560"/>
           </a:xfrm>
           <a:prstGeom prst="rect">
             <a:avLst/>
@@ -8512,7 +8625,7 @@
         <p:spPr>
           <a:xfrm>
             <a:off x="864000" y="2520000"/>
-            <a:ext cx="2015280" cy="575280"/>
+            <a:ext cx="2014560" cy="574560"/>
           </a:xfrm>
           <a:prstGeom prst="rect">
             <a:avLst/>
@@ -8531,7 +8644,7 @@
         <p:spPr>
           <a:xfrm>
             <a:off x="360000" y="3096000"/>
-            <a:ext cx="2231280" cy="601560"/>
+            <a:ext cx="2230560" cy="600840"/>
           </a:xfrm>
           <a:prstGeom prst="rect">
             <a:avLst/>
@@ -8586,7 +8699,7 @@
         <p:spPr>
           <a:xfrm>
             <a:off x="3492000" y="2844000"/>
-            <a:ext cx="2231280" cy="601560"/>
+            <a:ext cx="2230560" cy="600840"/>
           </a:xfrm>
           <a:prstGeom prst="rect">
             <a:avLst/>
@@ -8651,7 +8764,7 @@
         <p:spPr>
           <a:xfrm>
             <a:off x="6912000" y="3384000"/>
-            <a:ext cx="2231280" cy="1369440"/>
+            <a:ext cx="2230560" cy="1368720"/>
           </a:xfrm>
           <a:prstGeom prst="rect">
             <a:avLst/>
@@ -8816,7 +8929,7 @@
         <p:spPr>
           <a:xfrm>
             <a:off x="360000" y="1296000"/>
-            <a:ext cx="8423280" cy="601560"/>
+            <a:ext cx="8422560" cy="600840"/>
           </a:xfrm>
           <a:prstGeom prst="rect">
             <a:avLst/>
@@ -8948,7 +9061,7 @@
         <p:spPr>
           <a:xfrm>
             <a:off x="3276000" y="4788000"/>
-            <a:ext cx="3635280" cy="1164240"/>
+            <a:ext cx="3634560" cy="1163520"/>
           </a:xfrm>
           <a:prstGeom prst="rect">
             <a:avLst/>
@@ -8973,7 +9086,7 @@
               </a:lnSpc>
               <a:buSzPct val="45000"/>
               <a:buFont typeface="StarSymbol"/>
-              <a:buChar char=""/>
+              <a:buChar char="l"/>
             </a:pPr>
             <a:r>
               <a:rPr i="1" lang="en-GB" sz="1500" strike="noStrike">
@@ -8994,7 +9107,7 @@
               </a:lnSpc>
               <a:buSzPct val="45000"/>
               <a:buFont typeface="StarSymbol"/>
-              <a:buChar char=""/>
+              <a:buChar char="l"/>
             </a:pPr>
             <a:r>
               <a:rPr i="1" lang="en-GB" sz="1500" strike="noStrike">
@@ -9015,7 +9128,7 @@
               </a:lnSpc>
               <a:buSzPct val="45000"/>
               <a:buFont typeface="StarSymbol"/>
-              <a:buChar char=""/>
+              <a:buChar char="l"/>
             </a:pPr>
             <a:r>
               <a:rPr i="1" lang="en-GB" sz="1500" strike="noStrike">
@@ -9036,7 +9149,7 @@
               </a:lnSpc>
               <a:buSzPct val="45000"/>
               <a:buFont typeface="StarSymbol"/>
-              <a:buChar char=""/>
+              <a:buChar char="l"/>
             </a:pPr>
             <a:r>
               <a:rPr i="1" lang="en-GB" sz="1500" strike="noStrike">
@@ -9057,7 +9170,7 @@
               </a:lnSpc>
               <a:buSzPct val="45000"/>
               <a:buFont typeface="StarSymbol"/>
-              <a:buChar char=""/>
+              <a:buChar char="l"/>
             </a:pPr>
             <a:r>
               <a:rPr i="1" lang="en-GB" sz="1500" strike="noStrike">
@@ -9131,7 +9244,7 @@
         <p:spPr>
           <a:xfrm>
             <a:off x="365040" y="294840"/>
-            <a:ext cx="7574760" cy="335880"/>
+            <a:ext cx="7574040" cy="335160"/>
           </a:xfrm>
           <a:prstGeom prst="rect">
             <a:avLst/>
@@ -9178,7 +9291,7 @@
         <p:spPr>
           <a:xfrm>
             <a:off x="7967520" y="6437160"/>
-            <a:ext cx="827640" cy="362520"/>
+            <a:ext cx="826920" cy="361800"/>
           </a:xfrm>
           <a:prstGeom prst="rect">
             <a:avLst/>
@@ -9202,7 +9315,7 @@
                 <a:spcPct val="100000"/>
               </a:lnSpc>
             </a:pPr>
-            <a:fld id="{9450ECC5-A8B1-4A6E-A8C4-CBDCA81FF8E7}" type="slidenum">
+            <a:fld id="{3ACE416D-C0E3-44F8-A51C-BF9BF236B7C0}" type="slidenum">
               <a:rPr lang="en-GB" sz="800" strike="noStrike">
                 <a:solidFill>
                   <a:srgbClr val="9a8b7d"/>
@@ -9225,7 +9338,7 @@
         <p:spPr>
           <a:xfrm>
             <a:off x="369720" y="6058080"/>
-            <a:ext cx="8443440" cy="120600"/>
+            <a:ext cx="8442720" cy="119880"/>
           </a:xfrm>
           <a:prstGeom prst="rect">
             <a:avLst/>
@@ -9255,7 +9368,7 @@
         <p:spPr>
           <a:xfrm>
             <a:off x="216000" y="6372000"/>
-            <a:ext cx="1510200" cy="446040"/>
+            <a:ext cx="1509480" cy="445320"/>
           </a:xfrm>
           <a:prstGeom prst="rect">
             <a:avLst/>
@@ -9278,7 +9391,7 @@
         <p:spPr>
           <a:xfrm>
             <a:off x="7944480" y="138240"/>
-            <a:ext cx="1126080" cy="868320"/>
+            <a:ext cx="1125360" cy="867600"/>
           </a:xfrm>
           <a:prstGeom prst="rect">
             <a:avLst/>
@@ -9297,7 +9410,7 @@
         <p:spPr>
           <a:xfrm>
             <a:off x="288000" y="6084000"/>
-            <a:ext cx="8422920" cy="203760"/>
+            <a:ext cx="8422200" cy="203040"/>
           </a:xfrm>
           <a:prstGeom prst="rect">
             <a:avLst/>
@@ -9348,7 +9461,7 @@
         <p:spPr>
           <a:xfrm>
             <a:off x="720000" y="1296000"/>
-            <a:ext cx="7632000" cy="4103280"/>
+            <a:ext cx="7631280" cy="4102560"/>
           </a:xfrm>
           <a:prstGeom prst="rect">
             <a:avLst/>
@@ -9367,7 +9480,7 @@
         <p:spPr>
           <a:xfrm>
             <a:off x="128520" y="672120"/>
-            <a:ext cx="7595280" cy="232560"/>
+            <a:ext cx="7594560" cy="231840"/>
           </a:xfrm>
           <a:prstGeom prst="rect">
             <a:avLst/>
@@ -9410,14 +9523,14 @@
       </p:sp>
       <p:sp>
         <p:nvSpPr>
-          <p:cNvPr id="158" name="TextShape 6"/>
-          <p:cNvSpPr txBox="1"/>
+          <p:cNvPr id="158" name="CustomShape 6"/>
+          <p:cNvSpPr/>
           <p:nvPr/>
         </p:nvSpPr>
         <p:spPr>
           <a:xfrm>
             <a:off x="0" y="5472000"/>
-            <a:ext cx="9144000" cy="346320"/>
+            <a:ext cx="9143280" cy="345600"/>
           </a:xfrm>
           <a:prstGeom prst="rect">
             <a:avLst/>
@@ -9427,19 +9540,37 @@
             <a:noFill/>
           </a:ln>
         </p:spPr>
+        <p:style>
+          <a:lnRef idx="0"/>
+          <a:fillRef idx="0"/>
+          <a:effectRef idx="0"/>
+          <a:fontRef idx="minor"/>
+        </p:style>
         <p:txBody>
           <a:bodyPr lIns="90000" rIns="90000" tIns="45000" bIns="45000"/>
           <a:p>
-            <a:pPr algn="ctr"/>
-            <a:r>
-              <a:rPr lang="en-GB">
-                <a:latin typeface="Arial"/>
+            <a:pPr algn="ctr">
+              <a:lnSpc>
+                <a:spcPct val="100000"/>
+              </a:lnSpc>
+            </a:pPr>
+            <a:r>
+              <a:rPr lang="en-GB" strike="noStrike">
+                <a:solidFill>
+                  <a:srgbClr val="000000"/>
+                </a:solidFill>
+                <a:latin typeface="Arial"/>
+                <a:ea typeface="DejaVu Sans"/>
               </a:rPr>
               <a:t>Screen shot of </a:t>
             </a:r>
             <a:r>
-              <a:rPr i="1" lang="en-GB">
-                <a:latin typeface="Arial"/>
+              <a:rPr i="1" lang="en-GB" strike="noStrike">
+                <a:solidFill>
+                  <a:srgbClr val="000000"/>
+                </a:solidFill>
+                <a:latin typeface="Arial"/>
+                <a:ea typeface="DejaVu Sans"/>
               </a:rPr>
               <a:t>Orange Canvas</a:t>
             </a:r>
@@ -9505,7 +9636,7 @@
         <p:spPr>
           <a:xfrm>
             <a:off x="365040" y="294840"/>
-            <a:ext cx="7574760" cy="335880"/>
+            <a:ext cx="7574040" cy="335160"/>
           </a:xfrm>
           <a:prstGeom prst="rect">
             <a:avLst/>
@@ -9552,7 +9683,7 @@
         <p:spPr>
           <a:xfrm>
             <a:off x="365040" y="1419480"/>
-            <a:ext cx="8420760" cy="4432680"/>
+            <a:ext cx="8420040" cy="4431960"/>
           </a:xfrm>
           <a:prstGeom prst="rect">
             <a:avLst/>
@@ -9625,7 +9756,7 @@
         <p:spPr>
           <a:xfrm>
             <a:off x="149040" y="692640"/>
-            <a:ext cx="7595280" cy="232560"/>
+            <a:ext cx="7594560" cy="231840"/>
           </a:xfrm>
           <a:prstGeom prst="rect">
             <a:avLst/>
@@ -9675,7 +9806,7 @@
         <p:spPr>
           <a:xfrm>
             <a:off x="7967520" y="6437160"/>
-            <a:ext cx="827640" cy="362520"/>
+            <a:ext cx="826920" cy="361800"/>
           </a:xfrm>
           <a:prstGeom prst="rect">
             <a:avLst/>
@@ -9699,7 +9830,7 @@
                 <a:spcPct val="100000"/>
               </a:lnSpc>
             </a:pPr>
-            <a:fld id="{01C5C6BD-D67F-4238-8986-3E96D2577271}" type="slidenum">
+            <a:fld id="{908AF208-F368-424B-A7CD-4EE88CBE7D87}" type="slidenum">
               <a:rPr lang="en-GB" sz="800" strike="noStrike">
                 <a:solidFill>
                   <a:srgbClr val="9a8b7d"/>
@@ -9722,7 +9853,7 @@
         <p:spPr>
           <a:xfrm>
             <a:off x="369720" y="6058080"/>
-            <a:ext cx="8443440" cy="120600"/>
+            <a:ext cx="8442720" cy="119880"/>
           </a:xfrm>
           <a:prstGeom prst="rect">
             <a:avLst/>
@@ -9752,7 +9883,7 @@
         <p:spPr>
           <a:xfrm>
             <a:off x="216000" y="6372000"/>
-            <a:ext cx="1510200" cy="446040"/>
+            <a:ext cx="1509480" cy="445320"/>
           </a:xfrm>
           <a:prstGeom prst="rect">
             <a:avLst/>
@@ -9775,7 +9906,7 @@
         <p:spPr>
           <a:xfrm>
             <a:off x="7944480" y="138240"/>
-            <a:ext cx="1126080" cy="868320"/>
+            <a:ext cx="1125360" cy="867600"/>
           </a:xfrm>
           <a:prstGeom prst="rect">
             <a:avLst/>
@@ -9794,7 +9925,7 @@
         <p:spPr>
           <a:xfrm>
             <a:off x="324000" y="6048000"/>
-            <a:ext cx="8423280" cy="204120"/>
+            <a:ext cx="8422560" cy="203400"/>
           </a:xfrm>
           <a:prstGeom prst="rect">
             <a:avLst/>

</xml_diff>